<commit_message>
rest of semester plan
</commit_message>
<xml_diff>
--- a/courses/cse3400-s2021/lecture13.pptx
+++ b/courses/cse3400-s2021/lecture13.pptx
@@ -17694,7 +17694,7 @@
             </a:pPr>
             <a:r>
               <a:rPr lang="en-US" dirty="0"/>
-              <a:t>The </a:t>
+              <a:t>Certificate revocation. </a:t>
             </a:r>
           </a:p>
           <a:p>
@@ -36777,7 +36777,7 @@
               <a:rPr lang="en-US" altLang="he-IL" sz="2400" dirty="0">
                 <a:sym typeface="Wingdings" panose="05000000000000000000" pitchFamily="2" charset="2"/>
               </a:rPr>
-              <a:t>Sections 8.1, 8.2, …</a:t>
+              <a:t>Sections 8.4, </a:t>
             </a:r>
           </a:p>
         </p:txBody>

</xml_diff>